<commit_message>
Updated to add myself and @juliale102 slides
</commit_message>
<xml_diff>
--- a/presentation/Demo Sprint 1.pptx
+++ b/presentation/Demo Sprint 1.pptx
@@ -9,6 +9,8 @@
     <p:sldId id="261" r:id="rId3"/>
     <p:sldId id="262" r:id="rId4"/>
     <p:sldId id="257" r:id="rId5"/>
+    <p:sldId id="263" r:id="rId6"/>
+    <p:sldId id="258" r:id="rId7"/>
   </p:sldIdLst>
   <p:sldSz cx="12192000" cy="6858000"/>
   <p:notesSz cx="6858000" cy="9144000"/>
@@ -317,6 +319,244 @@
     </pc:docChg>
   </pc:docChgLst>
   <pc:docChgLst>
+    <pc:chgData name="SALIH BERK GÖNENÇ" userId="S::sgonengo9@alumnes.ub.edu::40f93f94-c68b-45e1-a55b-b1b561fce5db" providerId="AD" clId="Web-{EA22E64A-5272-D202-EEBE-18FA62A848F0}"/>
+    <pc:docChg chg="addSld modSld">
+      <pc:chgData name="SALIH BERK GÖNENÇ" userId="S::sgonengo9@alumnes.ub.edu::40f93f94-c68b-45e1-a55b-b1b561fce5db" providerId="AD" clId="Web-{EA22E64A-5272-D202-EEBE-18FA62A848F0}" dt="2022-11-24T14:53:52.751" v="156" actId="20577"/>
+      <pc:docMkLst>
+        <pc:docMk/>
+      </pc:docMkLst>
+      <pc:sldChg chg="modSp">
+        <pc:chgData name="SALIH BERK GÖNENÇ" userId="S::sgonengo9@alumnes.ub.edu::40f93f94-c68b-45e1-a55b-b1b561fce5db" providerId="AD" clId="Web-{EA22E64A-5272-D202-EEBE-18FA62A848F0}" dt="2022-11-24T14:53:52.751" v="156" actId="20577"/>
+        <pc:sldMkLst>
+          <pc:docMk/>
+          <pc:sldMk cId="2406273178" sldId="256"/>
+        </pc:sldMkLst>
+        <pc:spChg chg="mod">
+          <ac:chgData name="SALIH BERK GÖNENÇ" userId="S::sgonengo9@alumnes.ub.edu::40f93f94-c68b-45e1-a55b-b1b561fce5db" providerId="AD" clId="Web-{EA22E64A-5272-D202-EEBE-18FA62A848F0}" dt="2022-11-24T14:53:52.751" v="156" actId="20577"/>
+          <ac:spMkLst>
+            <pc:docMk/>
+            <pc:sldMk cId="2406273178" sldId="256"/>
+            <ac:spMk id="3" creationId="{00000000-0000-0000-0000-000000000000}"/>
+          </ac:spMkLst>
+        </pc:spChg>
+      </pc:sldChg>
+      <pc:sldChg chg="addSp delSp modSp">
+        <pc:chgData name="SALIH BERK GÖNENÇ" userId="S::sgonengo9@alumnes.ub.edu::40f93f94-c68b-45e1-a55b-b1b561fce5db" providerId="AD" clId="Web-{EA22E64A-5272-D202-EEBE-18FA62A848F0}" dt="2022-11-24T14:46:53.864" v="152"/>
+        <pc:sldMkLst>
+          <pc:docMk/>
+          <pc:sldMk cId="3524462139" sldId="257"/>
+        </pc:sldMkLst>
+        <pc:spChg chg="add del mod">
+          <ac:chgData name="SALIH BERK GÖNENÇ" userId="S::sgonengo9@alumnes.ub.edu::40f93f94-c68b-45e1-a55b-b1b561fce5db" providerId="AD" clId="Web-{EA22E64A-5272-D202-EEBE-18FA62A848F0}" dt="2022-11-24T14:23:07.853" v="35"/>
+          <ac:spMkLst>
+            <pc:docMk/>
+            <pc:sldMk cId="3524462139" sldId="257"/>
+            <ac:spMk id="3" creationId="{E7DBCD9A-3537-8386-CBE9-AD63137AE10E}"/>
+          </ac:spMkLst>
+        </pc:spChg>
+        <pc:spChg chg="add del mod">
+          <ac:chgData name="SALIH BERK GÖNENÇ" userId="S::sgonengo9@alumnes.ub.edu::40f93f94-c68b-45e1-a55b-b1b561fce5db" providerId="AD" clId="Web-{EA22E64A-5272-D202-EEBE-18FA62A848F0}" dt="2022-11-24T14:28:55.207" v="72"/>
+          <ac:spMkLst>
+            <pc:docMk/>
+            <pc:sldMk cId="3524462139" sldId="257"/>
+            <ac:spMk id="7" creationId="{3F5F7782-3543-3F0D-7E91-954A188D921A}"/>
+          </ac:spMkLst>
+        </pc:spChg>
+        <pc:spChg chg="add mod">
+          <ac:chgData name="SALIH BERK GÖNENÇ" userId="S::sgonengo9@alumnes.ub.edu::40f93f94-c68b-45e1-a55b-b1b561fce5db" providerId="AD" clId="Web-{EA22E64A-5272-D202-EEBE-18FA62A848F0}" dt="2022-11-24T14:26:41.141" v="51" actId="1076"/>
+          <ac:spMkLst>
+            <pc:docMk/>
+            <pc:sldMk cId="3524462139" sldId="257"/>
+            <ac:spMk id="8" creationId="{67BA607F-FB28-7DC1-9D13-E6F0193EB8F8}"/>
+          </ac:spMkLst>
+        </pc:spChg>
+        <pc:spChg chg="add mod">
+          <ac:chgData name="SALIH BERK GÖNENÇ" userId="S::sgonengo9@alumnes.ub.edu::40f93f94-c68b-45e1-a55b-b1b561fce5db" providerId="AD" clId="Web-{EA22E64A-5272-D202-EEBE-18FA62A848F0}" dt="2022-11-24T14:32:28.776" v="91" actId="1076"/>
+          <ac:spMkLst>
+            <pc:docMk/>
+            <pc:sldMk cId="3524462139" sldId="257"/>
+            <ac:spMk id="9" creationId="{D0DA3E8E-270B-72C0-5E62-A59DA8725951}"/>
+          </ac:spMkLst>
+        </pc:spChg>
+        <pc:spChg chg="add del mod">
+          <ac:chgData name="SALIH BERK GÖNENÇ" userId="S::sgonengo9@alumnes.ub.edu::40f93f94-c68b-45e1-a55b-b1b561fce5db" providerId="AD" clId="Web-{EA22E64A-5272-D202-EEBE-18FA62A848F0}" dt="2022-11-24T14:28:52.082" v="71"/>
+          <ac:spMkLst>
+            <pc:docMk/>
+            <pc:sldMk cId="3524462139" sldId="257"/>
+            <ac:spMk id="10" creationId="{6A790F45-ACA3-54F4-5A40-FA9538C40925}"/>
+          </ac:spMkLst>
+        </pc:spChg>
+        <pc:spChg chg="add mod">
+          <ac:chgData name="SALIH BERK GÖNENÇ" userId="S::sgonengo9@alumnes.ub.edu::40f93f94-c68b-45e1-a55b-b1b561fce5db" providerId="AD" clId="Web-{EA22E64A-5272-D202-EEBE-18FA62A848F0}" dt="2022-11-24T14:34:05.294" v="110" actId="20577"/>
+          <ac:spMkLst>
+            <pc:docMk/>
+            <pc:sldMk cId="3524462139" sldId="257"/>
+            <ac:spMk id="16" creationId="{CAF5824F-247D-D21E-776D-1B5E55C06793}"/>
+          </ac:spMkLst>
+        </pc:spChg>
+        <pc:picChg chg="add del mod ord">
+          <ac:chgData name="SALIH BERK GÖNENÇ" userId="S::sgonengo9@alumnes.ub.edu::40f93f94-c68b-45e1-a55b-b1b561fce5db" providerId="AD" clId="Web-{EA22E64A-5272-D202-EEBE-18FA62A848F0}" dt="2022-11-24T14:22:48.837" v="34"/>
+          <ac:picMkLst>
+            <pc:docMk/>
+            <pc:sldMk cId="3524462139" sldId="257"/>
+            <ac:picMk id="4" creationId="{F2EC22DA-4526-C403-830A-5227A264A12E}"/>
+          </ac:picMkLst>
+        </pc:picChg>
+        <pc:picChg chg="add del mod ord">
+          <ac:chgData name="SALIH BERK GÖNENÇ" userId="S::sgonengo9@alumnes.ub.edu::40f93f94-c68b-45e1-a55b-b1b561fce5db" providerId="AD" clId="Web-{EA22E64A-5272-D202-EEBE-18FA62A848F0}" dt="2022-11-24T14:23:44.479" v="38"/>
+          <ac:picMkLst>
+            <pc:docMk/>
+            <pc:sldMk cId="3524462139" sldId="257"/>
+            <ac:picMk id="5" creationId="{2B80EBCE-92C9-C03F-5425-3B10EFD6ED3C}"/>
+          </ac:picMkLst>
+        </pc:picChg>
+        <pc:picChg chg="add mod ord">
+          <ac:chgData name="SALIH BERK GÖNENÇ" userId="S::sgonengo9@alumnes.ub.edu::40f93f94-c68b-45e1-a55b-b1b561fce5db" providerId="AD" clId="Web-{EA22E64A-5272-D202-EEBE-18FA62A848F0}" dt="2022-11-24T14:38:46.959" v="127" actId="1076"/>
+          <ac:picMkLst>
+            <pc:docMk/>
+            <pc:sldMk cId="3524462139" sldId="257"/>
+            <ac:picMk id="11" creationId="{CF89B704-E760-C61A-D91F-DFBDD0DC128A}"/>
+          </ac:picMkLst>
+        </pc:picChg>
+        <pc:picChg chg="add del mod">
+          <ac:chgData name="SALIH BERK GÖNENÇ" userId="S::sgonengo9@alumnes.ub.edu::40f93f94-c68b-45e1-a55b-b1b561fce5db" providerId="AD" clId="Web-{EA22E64A-5272-D202-EEBE-18FA62A848F0}" dt="2022-11-24T14:30:17.147" v="82"/>
+          <ac:picMkLst>
+            <pc:docMk/>
+            <pc:sldMk cId="3524462139" sldId="257"/>
+            <ac:picMk id="13" creationId="{B5DAA82A-F010-0A21-0772-1325B8EE1469}"/>
+          </ac:picMkLst>
+        </pc:picChg>
+        <pc:picChg chg="add del mod">
+          <ac:chgData name="SALIH BERK GÖNENÇ" userId="S::sgonengo9@alumnes.ub.edu::40f93f94-c68b-45e1-a55b-b1b561fce5db" providerId="AD" clId="Web-{EA22E64A-5272-D202-EEBE-18FA62A848F0}" dt="2022-11-24T14:35:58.970" v="118"/>
+          <ac:picMkLst>
+            <pc:docMk/>
+            <pc:sldMk cId="3524462139" sldId="257"/>
+            <ac:picMk id="17" creationId="{E182E313-E352-4F12-9DEE-223D73C967F5}"/>
+          </ac:picMkLst>
+        </pc:picChg>
+        <pc:picChg chg="add mod">
+          <ac:chgData name="SALIH BERK GÖNENÇ" userId="S::sgonengo9@alumnes.ub.edu::40f93f94-c68b-45e1-a55b-b1b561fce5db" providerId="AD" clId="Web-{EA22E64A-5272-D202-EEBE-18FA62A848F0}" dt="2022-11-24T14:37:45.801" v="124" actId="1076"/>
+          <ac:picMkLst>
+            <pc:docMk/>
+            <pc:sldMk cId="3524462139" sldId="257"/>
+            <ac:picMk id="18" creationId="{3507A342-ECA0-4BBD-FF0A-1177C68074D4}"/>
+          </ac:picMkLst>
+        </pc:picChg>
+        <pc:picChg chg="add mod">
+          <ac:chgData name="SALIH BERK GÖNENÇ" userId="S::sgonengo9@alumnes.ub.edu::40f93f94-c68b-45e1-a55b-b1b561fce5db" providerId="AD" clId="Web-{EA22E64A-5272-D202-EEBE-18FA62A848F0}" dt="2022-11-24T14:42:57.404" v="146" actId="1076"/>
+          <ac:picMkLst>
+            <pc:docMk/>
+            <pc:sldMk cId="3524462139" sldId="257"/>
+            <ac:picMk id="21" creationId="{43D2FD65-C25E-3ADD-8704-231DDEA1C2E3}"/>
+          </ac:picMkLst>
+        </pc:picChg>
+        <pc:cxnChg chg="add mod">
+          <ac:chgData name="SALIH BERK GÖNENÇ" userId="S::sgonengo9@alumnes.ub.edu::40f93f94-c68b-45e1-a55b-b1b561fce5db" providerId="AD" clId="Web-{EA22E64A-5272-D202-EEBE-18FA62A848F0}" dt="2022-11-24T14:32:54.683" v="94" actId="14100"/>
+          <ac:cxnSpMkLst>
+            <pc:docMk/>
+            <pc:sldMk cId="3524462139" sldId="257"/>
+            <ac:cxnSpMk id="12" creationId="{1326951E-E461-0622-44D9-CB85AF66EFAF}"/>
+          </ac:cxnSpMkLst>
+        </pc:cxnChg>
+        <pc:cxnChg chg="add del mod">
+          <ac:chgData name="SALIH BERK GÖNENÇ" userId="S::sgonengo9@alumnes.ub.edu::40f93f94-c68b-45e1-a55b-b1b561fce5db" providerId="AD" clId="Web-{EA22E64A-5272-D202-EEBE-18FA62A848F0}" dt="2022-11-24T14:46:53.864" v="152"/>
+          <ac:cxnSpMkLst>
+            <pc:docMk/>
+            <pc:sldMk cId="3524462139" sldId="257"/>
+            <ac:cxnSpMk id="14" creationId="{984DDCEC-55A0-2A7A-23DA-9E72085E1863}"/>
+          </ac:cxnSpMkLst>
+        </pc:cxnChg>
+        <pc:cxnChg chg="add mod">
+          <ac:chgData name="SALIH BERK GÖNENÇ" userId="S::sgonengo9@alumnes.ub.edu::40f93f94-c68b-45e1-a55b-b1b561fce5db" providerId="AD" clId="Web-{EA22E64A-5272-D202-EEBE-18FA62A848F0}" dt="2022-11-24T14:33:05.011" v="97" actId="14100"/>
+          <ac:cxnSpMkLst>
+            <pc:docMk/>
+            <pc:sldMk cId="3524462139" sldId="257"/>
+            <ac:cxnSpMk id="15" creationId="{34D7D246-7460-12E8-E591-A1D0F1565383}"/>
+          </ac:cxnSpMkLst>
+        </pc:cxnChg>
+        <pc:cxnChg chg="add del">
+          <ac:chgData name="SALIH BERK GÖNENÇ" userId="S::sgonengo9@alumnes.ub.edu::40f93f94-c68b-45e1-a55b-b1b561fce5db" providerId="AD" clId="Web-{EA22E64A-5272-D202-EEBE-18FA62A848F0}" dt="2022-11-24T14:38:51.334" v="128"/>
+          <ac:cxnSpMkLst>
+            <pc:docMk/>
+            <pc:sldMk cId="3524462139" sldId="257"/>
+            <ac:cxnSpMk id="19" creationId="{6ED9442A-C7D8-E0CB-106E-C124F2070B90}"/>
+          </ac:cxnSpMkLst>
+        </pc:cxnChg>
+        <pc:cxnChg chg="add mod">
+          <ac:chgData name="SALIH BERK GÖNENÇ" userId="S::sgonengo9@alumnes.ub.edu::40f93f94-c68b-45e1-a55b-b1b561fce5db" providerId="AD" clId="Web-{EA22E64A-5272-D202-EEBE-18FA62A848F0}" dt="2022-11-24T14:40:07.039" v="139" actId="14100"/>
+          <ac:cxnSpMkLst>
+            <pc:docMk/>
+            <pc:sldMk cId="3524462139" sldId="257"/>
+            <ac:cxnSpMk id="20" creationId="{93EE7CFA-B56B-BC58-2E25-C17E1FF50CBC}"/>
+          </ac:cxnSpMkLst>
+        </pc:cxnChg>
+        <pc:cxnChg chg="add mod">
+          <ac:chgData name="SALIH BERK GÖNENÇ" userId="S::sgonengo9@alumnes.ub.edu::40f93f94-c68b-45e1-a55b-b1b561fce5db" providerId="AD" clId="Web-{EA22E64A-5272-D202-EEBE-18FA62A848F0}" dt="2022-11-24T14:43:46.139" v="151" actId="14100"/>
+          <ac:cxnSpMkLst>
+            <pc:docMk/>
+            <pc:sldMk cId="3524462139" sldId="257"/>
+            <ac:cxnSpMk id="22" creationId="{39F66963-EAEC-31CA-7023-4A7EB30AD4C6}"/>
+          </ac:cxnSpMkLst>
+        </pc:cxnChg>
+      </pc:sldChg>
+      <pc:sldChg chg="addSp delSp modSp new mod setBg">
+        <pc:chgData name="SALIH BERK GÖNENÇ" userId="S::sgonengo9@alumnes.ub.edu::40f93f94-c68b-45e1-a55b-b1b561fce5db" providerId="AD" clId="Web-{EA22E64A-5272-D202-EEBE-18FA62A848F0}" dt="2022-11-24T14:13:05.898" v="14"/>
+        <pc:sldMkLst>
+          <pc:docMk/>
+          <pc:sldMk cId="235367535" sldId="259"/>
+        </pc:sldMkLst>
+        <pc:spChg chg="mod">
+          <ac:chgData name="SALIH BERK GÖNENÇ" userId="S::sgonengo9@alumnes.ub.edu::40f93f94-c68b-45e1-a55b-b1b561fce5db" providerId="AD" clId="Web-{EA22E64A-5272-D202-EEBE-18FA62A848F0}" dt="2022-11-24T14:13:03.867" v="13"/>
+          <ac:spMkLst>
+            <pc:docMk/>
+            <pc:sldMk cId="235367535" sldId="259"/>
+            <ac:spMk id="2" creationId="{1F21A4E2-A96B-35A4-1B88-202FC8AD878C}"/>
+          </ac:spMkLst>
+        </pc:spChg>
+        <pc:spChg chg="add del mod">
+          <ac:chgData name="SALIH BERK GÖNENÇ" userId="S::sgonengo9@alumnes.ub.edu::40f93f94-c68b-45e1-a55b-b1b561fce5db" providerId="AD" clId="Web-{EA22E64A-5272-D202-EEBE-18FA62A848F0}" dt="2022-11-24T14:13:05.898" v="14"/>
+          <ac:spMkLst>
+            <pc:docMk/>
+            <pc:sldMk cId="235367535" sldId="259"/>
+            <ac:spMk id="3" creationId="{0C24C2D7-30E4-BFD6-2EB5-4417CBF9E5B7}"/>
+          </ac:spMkLst>
+        </pc:spChg>
+        <pc:spChg chg="add del mod">
+          <ac:chgData name="SALIH BERK GÖNENÇ" userId="S::sgonengo9@alumnes.ub.edu::40f93f94-c68b-45e1-a55b-b1b561fce5db" providerId="AD" clId="Web-{EA22E64A-5272-D202-EEBE-18FA62A848F0}" dt="2022-11-24T14:13:01.945" v="12"/>
+          <ac:spMkLst>
+            <pc:docMk/>
+            <pc:sldMk cId="235367535" sldId="259"/>
+            <ac:spMk id="6" creationId="{B901739F-47DD-FC5C-6BA9-E1538FEE9FA4}"/>
+          </ac:spMkLst>
+        </pc:spChg>
+        <pc:spChg chg="add del">
+          <ac:chgData name="SALIH BERK GÖNENÇ" userId="S::sgonengo9@alumnes.ub.edu::40f93f94-c68b-45e1-a55b-b1b561fce5db" providerId="AD" clId="Web-{EA22E64A-5272-D202-EEBE-18FA62A848F0}" dt="2022-11-24T14:13:03.867" v="13"/>
+          <ac:spMkLst>
+            <pc:docMk/>
+            <pc:sldMk cId="235367535" sldId="259"/>
+            <ac:spMk id="9" creationId="{A4AC5506-6312-4701-8D3C-40187889A947}"/>
+          </ac:spMkLst>
+        </pc:spChg>
+        <pc:picChg chg="add del mod ord">
+          <ac:chgData name="SALIH BERK GÖNENÇ" userId="S::sgonengo9@alumnes.ub.edu::40f93f94-c68b-45e1-a55b-b1b561fce5db" providerId="AD" clId="Web-{EA22E64A-5272-D202-EEBE-18FA62A848F0}" dt="2022-11-24T14:13:05.898" v="14"/>
+          <ac:picMkLst>
+            <pc:docMk/>
+            <pc:sldMk cId="235367535" sldId="259"/>
+            <ac:picMk id="4" creationId="{C051905E-7F32-CC09-219F-17C4A6A20F14}"/>
+          </ac:picMkLst>
+        </pc:picChg>
+        <pc:picChg chg="add del mod">
+          <ac:chgData name="SALIH BERK GÖNENÇ" userId="S::sgonengo9@alumnes.ub.edu::40f93f94-c68b-45e1-a55b-b1b561fce5db" providerId="AD" clId="Web-{EA22E64A-5272-D202-EEBE-18FA62A848F0}" dt="2022-11-24T14:12:58.257" v="10"/>
+          <ac:picMkLst>
+            <pc:docMk/>
+            <pc:sldMk cId="235367535" sldId="259"/>
+            <ac:picMk id="7" creationId="{3F7345AB-7D2E-DD89-71AC-499AB958AC05}"/>
+          </ac:picMkLst>
+        </pc:picChg>
+      </pc:sldChg>
+    </pc:docChg>
+  </pc:docChgLst>
+  <pc:docChgLst>
     <pc:chgData name="ALESSIA SIMONE" userId="S::asimonsi15@alumnes.ub.edu::090428c6-a9de-46c7-ac19-d34cbeaf40c5" providerId="AD" clId="Web-{790592EB-188E-3037-BA18-045D0EC281C2}"/>
     <pc:docChg chg="addSld delSld modSld">
       <pc:chgData name="ALESSIA SIMONE" userId="S::asimonsi15@alumnes.ub.edu::090428c6-a9de-46c7-ac19-d34cbeaf40c5" providerId="AD" clId="Web-{790592EB-188E-3037-BA18-045D0EC281C2}" dt="2022-11-25T15:37:17.901" v="687"/>
@@ -677,244 +917,6 @@
           <pc:docMk/>
           <pc:sldMk cId="3940883920" sldId="263"/>
         </pc:sldMkLst>
-      </pc:sldChg>
-    </pc:docChg>
-  </pc:docChgLst>
-  <pc:docChgLst>
-    <pc:chgData name="SALIH BERK GÖNENÇ" userId="S::sgonengo9@alumnes.ub.edu::40f93f94-c68b-45e1-a55b-b1b561fce5db" providerId="AD" clId="Web-{EA22E64A-5272-D202-EEBE-18FA62A848F0}"/>
-    <pc:docChg chg="addSld modSld">
-      <pc:chgData name="SALIH BERK GÖNENÇ" userId="S::sgonengo9@alumnes.ub.edu::40f93f94-c68b-45e1-a55b-b1b561fce5db" providerId="AD" clId="Web-{EA22E64A-5272-D202-EEBE-18FA62A848F0}" dt="2022-11-24T14:53:52.751" v="156" actId="20577"/>
-      <pc:docMkLst>
-        <pc:docMk/>
-      </pc:docMkLst>
-      <pc:sldChg chg="modSp">
-        <pc:chgData name="SALIH BERK GÖNENÇ" userId="S::sgonengo9@alumnes.ub.edu::40f93f94-c68b-45e1-a55b-b1b561fce5db" providerId="AD" clId="Web-{EA22E64A-5272-D202-EEBE-18FA62A848F0}" dt="2022-11-24T14:53:52.751" v="156" actId="20577"/>
-        <pc:sldMkLst>
-          <pc:docMk/>
-          <pc:sldMk cId="2406273178" sldId="256"/>
-        </pc:sldMkLst>
-        <pc:spChg chg="mod">
-          <ac:chgData name="SALIH BERK GÖNENÇ" userId="S::sgonengo9@alumnes.ub.edu::40f93f94-c68b-45e1-a55b-b1b561fce5db" providerId="AD" clId="Web-{EA22E64A-5272-D202-EEBE-18FA62A848F0}" dt="2022-11-24T14:53:52.751" v="156" actId="20577"/>
-          <ac:spMkLst>
-            <pc:docMk/>
-            <pc:sldMk cId="2406273178" sldId="256"/>
-            <ac:spMk id="3" creationId="{00000000-0000-0000-0000-000000000000}"/>
-          </ac:spMkLst>
-        </pc:spChg>
-      </pc:sldChg>
-      <pc:sldChg chg="addSp delSp modSp">
-        <pc:chgData name="SALIH BERK GÖNENÇ" userId="S::sgonengo9@alumnes.ub.edu::40f93f94-c68b-45e1-a55b-b1b561fce5db" providerId="AD" clId="Web-{EA22E64A-5272-D202-EEBE-18FA62A848F0}" dt="2022-11-24T14:46:53.864" v="152"/>
-        <pc:sldMkLst>
-          <pc:docMk/>
-          <pc:sldMk cId="3524462139" sldId="257"/>
-        </pc:sldMkLst>
-        <pc:spChg chg="add del mod">
-          <ac:chgData name="SALIH BERK GÖNENÇ" userId="S::sgonengo9@alumnes.ub.edu::40f93f94-c68b-45e1-a55b-b1b561fce5db" providerId="AD" clId="Web-{EA22E64A-5272-D202-EEBE-18FA62A848F0}" dt="2022-11-24T14:23:07.853" v="35"/>
-          <ac:spMkLst>
-            <pc:docMk/>
-            <pc:sldMk cId="3524462139" sldId="257"/>
-            <ac:spMk id="3" creationId="{E7DBCD9A-3537-8386-CBE9-AD63137AE10E}"/>
-          </ac:spMkLst>
-        </pc:spChg>
-        <pc:spChg chg="add del mod">
-          <ac:chgData name="SALIH BERK GÖNENÇ" userId="S::sgonengo9@alumnes.ub.edu::40f93f94-c68b-45e1-a55b-b1b561fce5db" providerId="AD" clId="Web-{EA22E64A-5272-D202-EEBE-18FA62A848F0}" dt="2022-11-24T14:28:55.207" v="72"/>
-          <ac:spMkLst>
-            <pc:docMk/>
-            <pc:sldMk cId="3524462139" sldId="257"/>
-            <ac:spMk id="7" creationId="{3F5F7782-3543-3F0D-7E91-954A188D921A}"/>
-          </ac:spMkLst>
-        </pc:spChg>
-        <pc:spChg chg="add mod">
-          <ac:chgData name="SALIH BERK GÖNENÇ" userId="S::sgonengo9@alumnes.ub.edu::40f93f94-c68b-45e1-a55b-b1b561fce5db" providerId="AD" clId="Web-{EA22E64A-5272-D202-EEBE-18FA62A848F0}" dt="2022-11-24T14:26:41.141" v="51" actId="1076"/>
-          <ac:spMkLst>
-            <pc:docMk/>
-            <pc:sldMk cId="3524462139" sldId="257"/>
-            <ac:spMk id="8" creationId="{67BA607F-FB28-7DC1-9D13-E6F0193EB8F8}"/>
-          </ac:spMkLst>
-        </pc:spChg>
-        <pc:spChg chg="add mod">
-          <ac:chgData name="SALIH BERK GÖNENÇ" userId="S::sgonengo9@alumnes.ub.edu::40f93f94-c68b-45e1-a55b-b1b561fce5db" providerId="AD" clId="Web-{EA22E64A-5272-D202-EEBE-18FA62A848F0}" dt="2022-11-24T14:32:28.776" v="91" actId="1076"/>
-          <ac:spMkLst>
-            <pc:docMk/>
-            <pc:sldMk cId="3524462139" sldId="257"/>
-            <ac:spMk id="9" creationId="{D0DA3E8E-270B-72C0-5E62-A59DA8725951}"/>
-          </ac:spMkLst>
-        </pc:spChg>
-        <pc:spChg chg="add del mod">
-          <ac:chgData name="SALIH BERK GÖNENÇ" userId="S::sgonengo9@alumnes.ub.edu::40f93f94-c68b-45e1-a55b-b1b561fce5db" providerId="AD" clId="Web-{EA22E64A-5272-D202-EEBE-18FA62A848F0}" dt="2022-11-24T14:28:52.082" v="71"/>
-          <ac:spMkLst>
-            <pc:docMk/>
-            <pc:sldMk cId="3524462139" sldId="257"/>
-            <ac:spMk id="10" creationId="{6A790F45-ACA3-54F4-5A40-FA9538C40925}"/>
-          </ac:spMkLst>
-        </pc:spChg>
-        <pc:spChg chg="add mod">
-          <ac:chgData name="SALIH BERK GÖNENÇ" userId="S::sgonengo9@alumnes.ub.edu::40f93f94-c68b-45e1-a55b-b1b561fce5db" providerId="AD" clId="Web-{EA22E64A-5272-D202-EEBE-18FA62A848F0}" dt="2022-11-24T14:34:05.294" v="110" actId="20577"/>
-          <ac:spMkLst>
-            <pc:docMk/>
-            <pc:sldMk cId="3524462139" sldId="257"/>
-            <ac:spMk id="16" creationId="{CAF5824F-247D-D21E-776D-1B5E55C06793}"/>
-          </ac:spMkLst>
-        </pc:spChg>
-        <pc:picChg chg="add del mod ord">
-          <ac:chgData name="SALIH BERK GÖNENÇ" userId="S::sgonengo9@alumnes.ub.edu::40f93f94-c68b-45e1-a55b-b1b561fce5db" providerId="AD" clId="Web-{EA22E64A-5272-D202-EEBE-18FA62A848F0}" dt="2022-11-24T14:22:48.837" v="34"/>
-          <ac:picMkLst>
-            <pc:docMk/>
-            <pc:sldMk cId="3524462139" sldId="257"/>
-            <ac:picMk id="4" creationId="{F2EC22DA-4526-C403-830A-5227A264A12E}"/>
-          </ac:picMkLst>
-        </pc:picChg>
-        <pc:picChg chg="add del mod ord">
-          <ac:chgData name="SALIH BERK GÖNENÇ" userId="S::sgonengo9@alumnes.ub.edu::40f93f94-c68b-45e1-a55b-b1b561fce5db" providerId="AD" clId="Web-{EA22E64A-5272-D202-EEBE-18FA62A848F0}" dt="2022-11-24T14:23:44.479" v="38"/>
-          <ac:picMkLst>
-            <pc:docMk/>
-            <pc:sldMk cId="3524462139" sldId="257"/>
-            <ac:picMk id="5" creationId="{2B80EBCE-92C9-C03F-5425-3B10EFD6ED3C}"/>
-          </ac:picMkLst>
-        </pc:picChg>
-        <pc:picChg chg="add mod ord">
-          <ac:chgData name="SALIH BERK GÖNENÇ" userId="S::sgonengo9@alumnes.ub.edu::40f93f94-c68b-45e1-a55b-b1b561fce5db" providerId="AD" clId="Web-{EA22E64A-5272-D202-EEBE-18FA62A848F0}" dt="2022-11-24T14:38:46.959" v="127" actId="1076"/>
-          <ac:picMkLst>
-            <pc:docMk/>
-            <pc:sldMk cId="3524462139" sldId="257"/>
-            <ac:picMk id="11" creationId="{CF89B704-E760-C61A-D91F-DFBDD0DC128A}"/>
-          </ac:picMkLst>
-        </pc:picChg>
-        <pc:picChg chg="add del mod">
-          <ac:chgData name="SALIH BERK GÖNENÇ" userId="S::sgonengo9@alumnes.ub.edu::40f93f94-c68b-45e1-a55b-b1b561fce5db" providerId="AD" clId="Web-{EA22E64A-5272-D202-EEBE-18FA62A848F0}" dt="2022-11-24T14:30:17.147" v="82"/>
-          <ac:picMkLst>
-            <pc:docMk/>
-            <pc:sldMk cId="3524462139" sldId="257"/>
-            <ac:picMk id="13" creationId="{B5DAA82A-F010-0A21-0772-1325B8EE1469}"/>
-          </ac:picMkLst>
-        </pc:picChg>
-        <pc:picChg chg="add del mod">
-          <ac:chgData name="SALIH BERK GÖNENÇ" userId="S::sgonengo9@alumnes.ub.edu::40f93f94-c68b-45e1-a55b-b1b561fce5db" providerId="AD" clId="Web-{EA22E64A-5272-D202-EEBE-18FA62A848F0}" dt="2022-11-24T14:35:58.970" v="118"/>
-          <ac:picMkLst>
-            <pc:docMk/>
-            <pc:sldMk cId="3524462139" sldId="257"/>
-            <ac:picMk id="17" creationId="{E182E313-E352-4F12-9DEE-223D73C967F5}"/>
-          </ac:picMkLst>
-        </pc:picChg>
-        <pc:picChg chg="add mod">
-          <ac:chgData name="SALIH BERK GÖNENÇ" userId="S::sgonengo9@alumnes.ub.edu::40f93f94-c68b-45e1-a55b-b1b561fce5db" providerId="AD" clId="Web-{EA22E64A-5272-D202-EEBE-18FA62A848F0}" dt="2022-11-24T14:37:45.801" v="124" actId="1076"/>
-          <ac:picMkLst>
-            <pc:docMk/>
-            <pc:sldMk cId="3524462139" sldId="257"/>
-            <ac:picMk id="18" creationId="{3507A342-ECA0-4BBD-FF0A-1177C68074D4}"/>
-          </ac:picMkLst>
-        </pc:picChg>
-        <pc:picChg chg="add mod">
-          <ac:chgData name="SALIH BERK GÖNENÇ" userId="S::sgonengo9@alumnes.ub.edu::40f93f94-c68b-45e1-a55b-b1b561fce5db" providerId="AD" clId="Web-{EA22E64A-5272-D202-EEBE-18FA62A848F0}" dt="2022-11-24T14:42:57.404" v="146" actId="1076"/>
-          <ac:picMkLst>
-            <pc:docMk/>
-            <pc:sldMk cId="3524462139" sldId="257"/>
-            <ac:picMk id="21" creationId="{43D2FD65-C25E-3ADD-8704-231DDEA1C2E3}"/>
-          </ac:picMkLst>
-        </pc:picChg>
-        <pc:cxnChg chg="add mod">
-          <ac:chgData name="SALIH BERK GÖNENÇ" userId="S::sgonengo9@alumnes.ub.edu::40f93f94-c68b-45e1-a55b-b1b561fce5db" providerId="AD" clId="Web-{EA22E64A-5272-D202-EEBE-18FA62A848F0}" dt="2022-11-24T14:32:54.683" v="94" actId="14100"/>
-          <ac:cxnSpMkLst>
-            <pc:docMk/>
-            <pc:sldMk cId="3524462139" sldId="257"/>
-            <ac:cxnSpMk id="12" creationId="{1326951E-E461-0622-44D9-CB85AF66EFAF}"/>
-          </ac:cxnSpMkLst>
-        </pc:cxnChg>
-        <pc:cxnChg chg="add del mod">
-          <ac:chgData name="SALIH BERK GÖNENÇ" userId="S::sgonengo9@alumnes.ub.edu::40f93f94-c68b-45e1-a55b-b1b561fce5db" providerId="AD" clId="Web-{EA22E64A-5272-D202-EEBE-18FA62A848F0}" dt="2022-11-24T14:46:53.864" v="152"/>
-          <ac:cxnSpMkLst>
-            <pc:docMk/>
-            <pc:sldMk cId="3524462139" sldId="257"/>
-            <ac:cxnSpMk id="14" creationId="{984DDCEC-55A0-2A7A-23DA-9E72085E1863}"/>
-          </ac:cxnSpMkLst>
-        </pc:cxnChg>
-        <pc:cxnChg chg="add mod">
-          <ac:chgData name="SALIH BERK GÖNENÇ" userId="S::sgonengo9@alumnes.ub.edu::40f93f94-c68b-45e1-a55b-b1b561fce5db" providerId="AD" clId="Web-{EA22E64A-5272-D202-EEBE-18FA62A848F0}" dt="2022-11-24T14:33:05.011" v="97" actId="14100"/>
-          <ac:cxnSpMkLst>
-            <pc:docMk/>
-            <pc:sldMk cId="3524462139" sldId="257"/>
-            <ac:cxnSpMk id="15" creationId="{34D7D246-7460-12E8-E591-A1D0F1565383}"/>
-          </ac:cxnSpMkLst>
-        </pc:cxnChg>
-        <pc:cxnChg chg="add del">
-          <ac:chgData name="SALIH BERK GÖNENÇ" userId="S::sgonengo9@alumnes.ub.edu::40f93f94-c68b-45e1-a55b-b1b561fce5db" providerId="AD" clId="Web-{EA22E64A-5272-D202-EEBE-18FA62A848F0}" dt="2022-11-24T14:38:51.334" v="128"/>
-          <ac:cxnSpMkLst>
-            <pc:docMk/>
-            <pc:sldMk cId="3524462139" sldId="257"/>
-            <ac:cxnSpMk id="19" creationId="{6ED9442A-C7D8-E0CB-106E-C124F2070B90}"/>
-          </ac:cxnSpMkLst>
-        </pc:cxnChg>
-        <pc:cxnChg chg="add mod">
-          <ac:chgData name="SALIH BERK GÖNENÇ" userId="S::sgonengo9@alumnes.ub.edu::40f93f94-c68b-45e1-a55b-b1b561fce5db" providerId="AD" clId="Web-{EA22E64A-5272-D202-EEBE-18FA62A848F0}" dt="2022-11-24T14:40:07.039" v="139" actId="14100"/>
-          <ac:cxnSpMkLst>
-            <pc:docMk/>
-            <pc:sldMk cId="3524462139" sldId="257"/>
-            <ac:cxnSpMk id="20" creationId="{93EE7CFA-B56B-BC58-2E25-C17E1FF50CBC}"/>
-          </ac:cxnSpMkLst>
-        </pc:cxnChg>
-        <pc:cxnChg chg="add mod">
-          <ac:chgData name="SALIH BERK GÖNENÇ" userId="S::sgonengo9@alumnes.ub.edu::40f93f94-c68b-45e1-a55b-b1b561fce5db" providerId="AD" clId="Web-{EA22E64A-5272-D202-EEBE-18FA62A848F0}" dt="2022-11-24T14:43:46.139" v="151" actId="14100"/>
-          <ac:cxnSpMkLst>
-            <pc:docMk/>
-            <pc:sldMk cId="3524462139" sldId="257"/>
-            <ac:cxnSpMk id="22" creationId="{39F66963-EAEC-31CA-7023-4A7EB30AD4C6}"/>
-          </ac:cxnSpMkLst>
-        </pc:cxnChg>
-      </pc:sldChg>
-      <pc:sldChg chg="addSp delSp modSp new mod setBg">
-        <pc:chgData name="SALIH BERK GÖNENÇ" userId="S::sgonengo9@alumnes.ub.edu::40f93f94-c68b-45e1-a55b-b1b561fce5db" providerId="AD" clId="Web-{EA22E64A-5272-D202-EEBE-18FA62A848F0}" dt="2022-11-24T14:13:05.898" v="14"/>
-        <pc:sldMkLst>
-          <pc:docMk/>
-          <pc:sldMk cId="235367535" sldId="259"/>
-        </pc:sldMkLst>
-        <pc:spChg chg="mod">
-          <ac:chgData name="SALIH BERK GÖNENÇ" userId="S::sgonengo9@alumnes.ub.edu::40f93f94-c68b-45e1-a55b-b1b561fce5db" providerId="AD" clId="Web-{EA22E64A-5272-D202-EEBE-18FA62A848F0}" dt="2022-11-24T14:13:03.867" v="13"/>
-          <ac:spMkLst>
-            <pc:docMk/>
-            <pc:sldMk cId="235367535" sldId="259"/>
-            <ac:spMk id="2" creationId="{1F21A4E2-A96B-35A4-1B88-202FC8AD878C}"/>
-          </ac:spMkLst>
-        </pc:spChg>
-        <pc:spChg chg="add del mod">
-          <ac:chgData name="SALIH BERK GÖNENÇ" userId="S::sgonengo9@alumnes.ub.edu::40f93f94-c68b-45e1-a55b-b1b561fce5db" providerId="AD" clId="Web-{EA22E64A-5272-D202-EEBE-18FA62A848F0}" dt="2022-11-24T14:13:05.898" v="14"/>
-          <ac:spMkLst>
-            <pc:docMk/>
-            <pc:sldMk cId="235367535" sldId="259"/>
-            <ac:spMk id="3" creationId="{0C24C2D7-30E4-BFD6-2EB5-4417CBF9E5B7}"/>
-          </ac:spMkLst>
-        </pc:spChg>
-        <pc:spChg chg="add del mod">
-          <ac:chgData name="SALIH BERK GÖNENÇ" userId="S::sgonengo9@alumnes.ub.edu::40f93f94-c68b-45e1-a55b-b1b561fce5db" providerId="AD" clId="Web-{EA22E64A-5272-D202-EEBE-18FA62A848F0}" dt="2022-11-24T14:13:01.945" v="12"/>
-          <ac:spMkLst>
-            <pc:docMk/>
-            <pc:sldMk cId="235367535" sldId="259"/>
-            <ac:spMk id="6" creationId="{B901739F-47DD-FC5C-6BA9-E1538FEE9FA4}"/>
-          </ac:spMkLst>
-        </pc:spChg>
-        <pc:spChg chg="add del">
-          <ac:chgData name="SALIH BERK GÖNENÇ" userId="S::sgonengo9@alumnes.ub.edu::40f93f94-c68b-45e1-a55b-b1b561fce5db" providerId="AD" clId="Web-{EA22E64A-5272-D202-EEBE-18FA62A848F0}" dt="2022-11-24T14:13:03.867" v="13"/>
-          <ac:spMkLst>
-            <pc:docMk/>
-            <pc:sldMk cId="235367535" sldId="259"/>
-            <ac:spMk id="9" creationId="{A4AC5506-6312-4701-8D3C-40187889A947}"/>
-          </ac:spMkLst>
-        </pc:spChg>
-        <pc:picChg chg="add del mod ord">
-          <ac:chgData name="SALIH BERK GÖNENÇ" userId="S::sgonengo9@alumnes.ub.edu::40f93f94-c68b-45e1-a55b-b1b561fce5db" providerId="AD" clId="Web-{EA22E64A-5272-D202-EEBE-18FA62A848F0}" dt="2022-11-24T14:13:05.898" v="14"/>
-          <ac:picMkLst>
-            <pc:docMk/>
-            <pc:sldMk cId="235367535" sldId="259"/>
-            <ac:picMk id="4" creationId="{C051905E-7F32-CC09-219F-17C4A6A20F14}"/>
-          </ac:picMkLst>
-        </pc:picChg>
-        <pc:picChg chg="add del mod">
-          <ac:chgData name="SALIH BERK GÖNENÇ" userId="S::sgonengo9@alumnes.ub.edu::40f93f94-c68b-45e1-a55b-b1b561fce5db" providerId="AD" clId="Web-{EA22E64A-5272-D202-EEBE-18FA62A848F0}" dt="2022-11-24T14:12:58.257" v="10"/>
-          <ac:picMkLst>
-            <pc:docMk/>
-            <pc:sldMk cId="235367535" sldId="259"/>
-            <ac:picMk id="7" creationId="{3F7345AB-7D2E-DD89-71AC-499AB958AC05}"/>
-          </ac:picMkLst>
-        </pc:picChg>
       </pc:sldChg>
     </pc:docChg>
   </pc:docChgLst>
@@ -1215,7 +1217,7 @@
           <a:p>
             <a:fld id="{0F1556C4-DFC3-4611-A7CC-780699185E26}" type="slidenum">
               <a:rPr lang="es-ES" smtClean="0"/>
-              <a:t>‹N›</a:t>
+              <a:t>‹Nº›</a:t>
             </a:fld>
             <a:endParaRPr lang="es-ES"/>
           </a:p>
@@ -1383,7 +1385,7 @@
           <a:p>
             <a:fld id="{0F1556C4-DFC3-4611-A7CC-780699185E26}" type="slidenum">
               <a:rPr lang="es-ES" smtClean="0"/>
-              <a:t>‹N›</a:t>
+              <a:t>‹Nº›</a:t>
             </a:fld>
             <a:endParaRPr lang="es-ES"/>
           </a:p>
@@ -1561,7 +1563,7 @@
           <a:p>
             <a:fld id="{0F1556C4-DFC3-4611-A7CC-780699185E26}" type="slidenum">
               <a:rPr lang="es-ES" smtClean="0"/>
-              <a:t>‹N›</a:t>
+              <a:t>‹Nº›</a:t>
             </a:fld>
             <a:endParaRPr lang="es-ES"/>
           </a:p>
@@ -1729,7 +1731,7 @@
           <a:p>
             <a:fld id="{0F1556C4-DFC3-4611-A7CC-780699185E26}" type="slidenum">
               <a:rPr lang="es-ES" smtClean="0"/>
-              <a:t>‹N›</a:t>
+              <a:t>‹Nº›</a:t>
             </a:fld>
             <a:endParaRPr lang="es-ES"/>
           </a:p>
@@ -1974,7 +1976,7 @@
           <a:p>
             <a:fld id="{0F1556C4-DFC3-4611-A7CC-780699185E26}" type="slidenum">
               <a:rPr lang="es-ES" smtClean="0"/>
-              <a:t>‹N›</a:t>
+              <a:t>‹Nº›</a:t>
             </a:fld>
             <a:endParaRPr lang="es-ES"/>
           </a:p>
@@ -2203,7 +2205,7 @@
           <a:p>
             <a:fld id="{0F1556C4-DFC3-4611-A7CC-780699185E26}" type="slidenum">
               <a:rPr lang="es-ES" smtClean="0"/>
-              <a:t>‹N›</a:t>
+              <a:t>‹Nº›</a:t>
             </a:fld>
             <a:endParaRPr lang="es-ES"/>
           </a:p>
@@ -2567,7 +2569,7 @@
           <a:p>
             <a:fld id="{0F1556C4-DFC3-4611-A7CC-780699185E26}" type="slidenum">
               <a:rPr lang="es-ES" smtClean="0"/>
-              <a:t>‹N›</a:t>
+              <a:t>‹Nº›</a:t>
             </a:fld>
             <a:endParaRPr lang="es-ES"/>
           </a:p>
@@ -2684,7 +2686,7 @@
           <a:p>
             <a:fld id="{0F1556C4-DFC3-4611-A7CC-780699185E26}" type="slidenum">
               <a:rPr lang="es-ES" smtClean="0"/>
-              <a:t>‹N›</a:t>
+              <a:t>‹Nº›</a:t>
             </a:fld>
             <a:endParaRPr lang="es-ES"/>
           </a:p>
@@ -2779,7 +2781,7 @@
           <a:p>
             <a:fld id="{0F1556C4-DFC3-4611-A7CC-780699185E26}" type="slidenum">
               <a:rPr lang="es-ES" smtClean="0"/>
-              <a:t>‹N›</a:t>
+              <a:t>‹Nº›</a:t>
             </a:fld>
             <a:endParaRPr lang="es-ES"/>
           </a:p>
@@ -3054,7 +3056,7 @@
           <a:p>
             <a:fld id="{0F1556C4-DFC3-4611-A7CC-780699185E26}" type="slidenum">
               <a:rPr lang="es-ES" smtClean="0"/>
-              <a:t>‹N›</a:t>
+              <a:t>‹Nº›</a:t>
             </a:fld>
             <a:endParaRPr lang="es-ES"/>
           </a:p>
@@ -3306,7 +3308,7 @@
           <a:p>
             <a:fld id="{0F1556C4-DFC3-4611-A7CC-780699185E26}" type="slidenum">
               <a:rPr lang="es-ES" smtClean="0"/>
-              <a:t>‹N›</a:t>
+              <a:t>‹Nº›</a:t>
             </a:fld>
             <a:endParaRPr lang="es-ES"/>
           </a:p>
@@ -3553,7 +3555,7 @@
           <a:p>
             <a:fld id="{0F1556C4-DFC3-4611-A7CC-780699185E26}" type="slidenum">
               <a:rPr lang="es-ES" smtClean="0"/>
-              <a:t>‹N›</a:t>
+              <a:t>‹Nº›</a:t>
             </a:fld>
             <a:endParaRPr lang="es-ES"/>
           </a:p>
@@ -6143,6 +6145,936 @@
 </p:sld>
 </file>
 
+<file path=ppt/slides/slide5.xml><?xml version="1.0" encoding="utf-8"?>
+<p:sld xmlns:a="http://schemas.openxmlformats.org/drawingml/2006/main" xmlns:r="http://schemas.openxmlformats.org/officeDocument/2006/relationships" xmlns:p="http://schemas.openxmlformats.org/presentationml/2006/main">
+  <p:cSld>
+    <p:spTree>
+      <p:nvGrpSpPr>
+        <p:cNvPr id="1" name=""/>
+        <p:cNvGrpSpPr/>
+        <p:nvPr/>
+      </p:nvGrpSpPr>
+      <p:grpSpPr>
+        <a:xfrm>
+          <a:off x="0" y="0"/>
+          <a:ext cx="0" cy="0"/>
+          <a:chOff x="0" y="0"/>
+          <a:chExt cx="0" cy="0"/>
+        </a:xfrm>
+      </p:grpSpPr>
+      <p:sp>
+        <p:nvSpPr>
+          <p:cNvPr id="2" name="Título 1">
+            <a:extLst>
+              <a:ext uri="{FF2B5EF4-FFF2-40B4-BE49-F238E27FC236}">
+                <a16:creationId xmlns:a16="http://schemas.microsoft.com/office/drawing/2014/main" id="{4F3DBAFE-C228-3EA2-D389-93F98EE2F067}"/>
+              </a:ext>
+            </a:extLst>
+          </p:cNvPr>
+          <p:cNvSpPr>
+            <a:spLocks noGrp="1"/>
+          </p:cNvSpPr>
+          <p:nvPr>
+            <p:ph type="title"/>
+          </p:nvPr>
+        </p:nvSpPr>
+        <p:spPr/>
+        <p:txBody>
+          <a:bodyPr>
+            <a:normAutofit/>
+          </a:bodyPr>
+          <a:lstStyle/>
+          <a:p>
+            <a:r>
+              <a:rPr lang="es-ES" dirty="0" err="1">
+                <a:ea typeface="+mj-lt"/>
+                <a:cs typeface="+mj-lt"/>
+              </a:rPr>
+              <a:t>Clean</a:t>
+            </a:r>
+            <a:r>
+              <a:rPr lang="es-ES" dirty="0">
+                <a:ea typeface="+mj-lt"/>
+                <a:cs typeface="+mj-lt"/>
+              </a:rPr>
+              <a:t> </a:t>
+            </a:r>
+            <a:r>
+              <a:rPr lang="es-ES" dirty="0" err="1">
+                <a:ea typeface="+mj-lt"/>
+                <a:cs typeface="+mj-lt"/>
+              </a:rPr>
+              <a:t>the</a:t>
+            </a:r>
+            <a:r>
+              <a:rPr lang="es-ES" dirty="0">
+                <a:ea typeface="+mj-lt"/>
+                <a:cs typeface="+mj-lt"/>
+              </a:rPr>
+              <a:t> data in </a:t>
+            </a:r>
+            <a:r>
+              <a:rPr lang="es-ES" dirty="0" err="1">
+                <a:ea typeface="+mj-lt"/>
+                <a:cs typeface="+mj-lt"/>
+              </a:rPr>
+              <a:t>order</a:t>
+            </a:r>
+            <a:r>
+              <a:rPr lang="es-ES" dirty="0">
+                <a:ea typeface="+mj-lt"/>
+                <a:cs typeface="+mj-lt"/>
+              </a:rPr>
+              <a:t> </a:t>
+            </a:r>
+            <a:r>
+              <a:rPr lang="es-ES" dirty="0" err="1">
+                <a:ea typeface="+mj-lt"/>
+                <a:cs typeface="+mj-lt"/>
+              </a:rPr>
+              <a:t>to</a:t>
+            </a:r>
+            <a:r>
+              <a:rPr lang="es-ES" dirty="0">
+                <a:ea typeface="+mj-lt"/>
+                <a:cs typeface="+mj-lt"/>
+              </a:rPr>
+              <a:t> </a:t>
+            </a:r>
+            <a:r>
+              <a:rPr lang="es-ES" dirty="0" err="1">
+                <a:ea typeface="+mj-lt"/>
+                <a:cs typeface="+mj-lt"/>
+              </a:rPr>
+              <a:t>develop</a:t>
+            </a:r>
+            <a:r>
+              <a:rPr lang="es-ES" dirty="0">
+                <a:ea typeface="+mj-lt"/>
+                <a:cs typeface="+mj-lt"/>
+              </a:rPr>
+              <a:t> a </a:t>
+            </a:r>
+            <a:r>
+              <a:rPr lang="es-ES" dirty="0" err="1">
+                <a:ea typeface="+mj-lt"/>
+                <a:cs typeface="+mj-lt"/>
+              </a:rPr>
+              <a:t>recommender</a:t>
+            </a:r>
+          </a:p>
+        </p:txBody>
+      </p:sp>
+      <p:sp>
+        <p:nvSpPr>
+          <p:cNvPr id="3" name="Marcador de contenido 2">
+            <a:extLst>
+              <a:ext uri="{FF2B5EF4-FFF2-40B4-BE49-F238E27FC236}">
+                <a16:creationId xmlns:a16="http://schemas.microsoft.com/office/drawing/2014/main" id="{B313FFA5-8CB5-66EE-4693-A96F0A0894CD}"/>
+              </a:ext>
+            </a:extLst>
+          </p:cNvPr>
+          <p:cNvSpPr>
+            <a:spLocks noGrp="1"/>
+          </p:cNvSpPr>
+          <p:nvPr>
+            <p:ph idx="1"/>
+          </p:nvPr>
+        </p:nvSpPr>
+        <p:spPr>
+          <a:xfrm>
+            <a:off x="838200" y="2287019"/>
+            <a:ext cx="10515600" cy="4351338"/>
+          </a:xfrm>
+        </p:spPr>
+        <p:txBody>
+          <a:bodyPr vert="horz" lIns="91440" tIns="45720" rIns="91440" bIns="45720" rtlCol="0" anchor="t">
+            <a:normAutofit/>
+          </a:bodyPr>
+          <a:lstStyle/>
+          <a:p>
+            <a:r>
+              <a:rPr lang="es-ES" err="1">
+                <a:ea typeface="+mn-lt"/>
+                <a:cs typeface="+mn-lt"/>
+              </a:rPr>
+              <a:t>Tasks</a:t>
+            </a:r>
+            <a:endParaRPr lang="en-US" err="1">
+              <a:ea typeface="+mn-lt"/>
+              <a:cs typeface="+mn-lt"/>
+            </a:endParaRPr>
+          </a:p>
+          <a:p>
+            <a:pPr lvl="1"/>
+            <a:r>
+              <a:rPr lang="es-ES" dirty="0">
+                <a:ea typeface="+mn-lt"/>
+                <a:cs typeface="+mn-lt"/>
+              </a:rPr>
+              <a:t>Deal </a:t>
+            </a:r>
+            <a:r>
+              <a:rPr lang="es-ES" dirty="0" err="1">
+                <a:ea typeface="+mn-lt"/>
+                <a:cs typeface="+mn-lt"/>
+              </a:rPr>
+              <a:t>with</a:t>
+            </a:r>
+            <a:r>
+              <a:rPr lang="es-ES" dirty="0">
+                <a:ea typeface="+mn-lt"/>
+                <a:cs typeface="+mn-lt"/>
+              </a:rPr>
+              <a:t> </a:t>
+            </a:r>
+            <a:r>
+              <a:rPr lang="es-ES" dirty="0" err="1">
+                <a:ea typeface="+mn-lt"/>
+                <a:cs typeface="+mn-lt"/>
+              </a:rPr>
+              <a:t>categorical</a:t>
+            </a:r>
+            <a:r>
+              <a:rPr lang="es-ES" dirty="0">
+                <a:ea typeface="+mn-lt"/>
+                <a:cs typeface="+mn-lt"/>
+              </a:rPr>
+              <a:t> data (</a:t>
+            </a:r>
+            <a:r>
+              <a:rPr lang="es-ES" dirty="0" err="1">
+                <a:ea typeface="+mn-lt"/>
+                <a:cs typeface="+mn-lt"/>
+              </a:rPr>
+              <a:t>encode</a:t>
+            </a:r>
+            <a:r>
+              <a:rPr lang="es-ES" dirty="0">
+                <a:ea typeface="+mn-lt"/>
+                <a:cs typeface="+mn-lt"/>
+              </a:rPr>
+              <a:t>)</a:t>
+            </a:r>
+          </a:p>
+          <a:p>
+            <a:pPr lvl="1"/>
+            <a:r>
+              <a:rPr lang="es-ES" dirty="0" err="1">
+                <a:ea typeface="+mn-lt"/>
+                <a:cs typeface="+mn-lt"/>
+              </a:rPr>
+              <a:t>Select</a:t>
+            </a:r>
+            <a:r>
+              <a:rPr lang="es-ES" dirty="0">
+                <a:ea typeface="+mn-lt"/>
+                <a:cs typeface="+mn-lt"/>
+              </a:rPr>
+              <a:t> </a:t>
+            </a:r>
+            <a:r>
+              <a:rPr lang="es-ES" dirty="0" err="1">
+                <a:ea typeface="+mn-lt"/>
+                <a:cs typeface="+mn-lt"/>
+              </a:rPr>
+              <a:t>relating</a:t>
+            </a:r>
+            <a:r>
+              <a:rPr lang="es-ES" dirty="0">
+                <a:ea typeface="+mn-lt"/>
+                <a:cs typeface="+mn-lt"/>
+              </a:rPr>
+              <a:t> / </a:t>
+            </a:r>
+            <a:r>
+              <a:rPr lang="es-ES" dirty="0" err="1">
+                <a:ea typeface="+mn-lt"/>
+                <a:cs typeface="+mn-lt"/>
+              </a:rPr>
+              <a:t>relevant</a:t>
+            </a:r>
+            <a:r>
+              <a:rPr lang="es-ES" dirty="0">
+                <a:ea typeface="+mn-lt"/>
+                <a:cs typeface="+mn-lt"/>
+              </a:rPr>
+              <a:t> </a:t>
+            </a:r>
+            <a:r>
+              <a:rPr lang="es-ES" dirty="0" err="1">
+                <a:ea typeface="+mn-lt"/>
+                <a:cs typeface="+mn-lt"/>
+              </a:rPr>
+              <a:t>features</a:t>
+            </a:r>
+            <a:endParaRPr lang="es-ES" dirty="0" err="1">
+              <a:cs typeface="Calibri"/>
+            </a:endParaRPr>
+          </a:p>
+          <a:p>
+            <a:pPr lvl="1"/>
+            <a:r>
+              <a:rPr lang="es-ES" dirty="0" err="1">
+                <a:ea typeface="+mn-lt"/>
+                <a:cs typeface="+mn-lt"/>
+              </a:rPr>
+              <a:t>Normalize</a:t>
+            </a:r>
+            <a:r>
+              <a:rPr lang="es-ES" dirty="0">
+                <a:ea typeface="+mn-lt"/>
+                <a:cs typeface="+mn-lt"/>
+              </a:rPr>
+              <a:t> </a:t>
+            </a:r>
+            <a:r>
+              <a:rPr lang="es-ES" dirty="0" err="1">
+                <a:ea typeface="+mn-lt"/>
+                <a:cs typeface="+mn-lt"/>
+              </a:rPr>
+              <a:t>the</a:t>
+            </a:r>
+            <a:r>
+              <a:rPr lang="es-ES" dirty="0">
+                <a:ea typeface="+mn-lt"/>
+                <a:cs typeface="+mn-lt"/>
+              </a:rPr>
+              <a:t> data</a:t>
+            </a:r>
+            <a:endParaRPr lang="es-ES" dirty="0">
+              <a:cs typeface="Calibri"/>
+            </a:endParaRPr>
+          </a:p>
+          <a:p>
+            <a:pPr marL="457200" lvl="1" indent="0">
+              <a:buNone/>
+            </a:pPr>
+            <a:endParaRPr lang="es-ES">
+              <a:cs typeface="Calibri"/>
+            </a:endParaRPr>
+          </a:p>
+          <a:p>
+            <a:pPr marL="457200" indent="-457200"/>
+            <a:r>
+              <a:rPr lang="es-ES" dirty="0">
+                <a:cs typeface="Calibri"/>
+              </a:rPr>
+              <a:t>Removed</a:t>
+            </a:r>
+          </a:p>
+          <a:p>
+            <a:pPr marL="914400" lvl="1" indent="-457200"/>
+            <a:r>
+              <a:rPr lang="es-ES" err="1">
+                <a:cs typeface="Calibri"/>
+              </a:rPr>
+              <a:t>Misunderstanding</a:t>
+            </a:r>
+            <a:endParaRPr lang="es-ES">
+              <a:cs typeface="Calibri"/>
+            </a:endParaRPr>
+          </a:p>
+        </p:txBody>
+      </p:sp>
+    </p:spTree>
+    <p:extLst>
+      <p:ext uri="{BB962C8B-B14F-4D97-AF65-F5344CB8AC3E}">
+        <p14:creationId xmlns:p14="http://schemas.microsoft.com/office/powerpoint/2010/main" val="3940883920"/>
+      </p:ext>
+    </p:extLst>
+  </p:cSld>
+  <p:clrMapOvr>
+    <a:masterClrMapping/>
+  </p:clrMapOvr>
+</p:sld>
+</file>
+
+<file path=ppt/slides/slide6.xml><?xml version="1.0" encoding="utf-8"?>
+<p:sld xmlns:a="http://schemas.openxmlformats.org/drawingml/2006/main" xmlns:r="http://schemas.openxmlformats.org/officeDocument/2006/relationships" xmlns:p="http://schemas.openxmlformats.org/presentationml/2006/main">
+  <p:cSld>
+    <p:spTree>
+      <p:nvGrpSpPr>
+        <p:cNvPr id="1" name=""/>
+        <p:cNvGrpSpPr/>
+        <p:nvPr/>
+      </p:nvGrpSpPr>
+      <p:grpSpPr>
+        <a:xfrm>
+          <a:off x="0" y="0"/>
+          <a:ext cx="0" cy="0"/>
+          <a:chOff x="0" y="0"/>
+          <a:chExt cx="0" cy="0"/>
+        </a:xfrm>
+      </p:grpSpPr>
+      <p:sp>
+        <p:nvSpPr>
+          <p:cNvPr id="2" name="Título 1">
+            <a:extLst>
+              <a:ext uri="{FF2B5EF4-FFF2-40B4-BE49-F238E27FC236}">
+                <a16:creationId xmlns:a16="http://schemas.microsoft.com/office/drawing/2014/main" id="{04FD6A47-F003-EA6B-EE0F-9DA160098A2A}"/>
+              </a:ext>
+            </a:extLst>
+          </p:cNvPr>
+          <p:cNvSpPr>
+            <a:spLocks noGrp="1"/>
+          </p:cNvSpPr>
+          <p:nvPr>
+            <p:ph type="title"/>
+          </p:nvPr>
+        </p:nvSpPr>
+        <p:spPr/>
+        <p:txBody>
+          <a:bodyPr/>
+          <a:lstStyle/>
+          <a:p>
+            <a:r>
+              <a:rPr lang="es-ES" dirty="0" err="1">
+                <a:cs typeface="Calibri Light"/>
+              </a:rPr>
+              <a:t>Comparison</a:t>
+            </a:r>
+            <a:r>
+              <a:rPr lang="es-ES" dirty="0">
+                <a:cs typeface="Calibri Light"/>
+              </a:rPr>
+              <a:t> </a:t>
+            </a:r>
+            <a:r>
+              <a:rPr lang="es-ES" dirty="0" err="1">
+                <a:cs typeface="Calibri Light"/>
+              </a:rPr>
+              <a:t>of</a:t>
+            </a:r>
+            <a:r>
+              <a:rPr lang="es-ES" dirty="0">
+                <a:cs typeface="Calibri Light"/>
+              </a:rPr>
+              <a:t> </a:t>
+            </a:r>
+            <a:r>
+              <a:rPr lang="es-ES" dirty="0" err="1">
+                <a:cs typeface="Calibri Light"/>
+              </a:rPr>
+              <a:t>Recommenders</a:t>
+            </a:r>
+            <a:r>
+              <a:rPr lang="es-ES" dirty="0">
+                <a:cs typeface="Calibri Light"/>
+              </a:rPr>
+              <a:t> </a:t>
+            </a:r>
+            <a:r>
+              <a:rPr lang="es-ES" dirty="0" err="1">
+                <a:cs typeface="Calibri Light"/>
+              </a:rPr>
+              <a:t>for</a:t>
+            </a:r>
+            <a:r>
+              <a:rPr lang="es-ES" dirty="0">
+                <a:cs typeface="Calibri Light"/>
+              </a:rPr>
+              <a:t> </a:t>
+            </a:r>
+            <a:r>
+              <a:rPr lang="es-ES" dirty="0" err="1">
+                <a:cs typeface="Calibri Light"/>
+              </a:rPr>
+              <a:t>Developer</a:t>
+            </a:r>
+          </a:p>
+        </p:txBody>
+      </p:sp>
+      <p:sp>
+        <p:nvSpPr>
+          <p:cNvPr id="3" name="Marcador de contenido 2">
+            <a:extLst>
+              <a:ext uri="{FF2B5EF4-FFF2-40B4-BE49-F238E27FC236}">
+                <a16:creationId xmlns:a16="http://schemas.microsoft.com/office/drawing/2014/main" id="{F054B916-0D47-0239-C738-A2334C2D45DF}"/>
+              </a:ext>
+            </a:extLst>
+          </p:cNvPr>
+          <p:cNvSpPr>
+            <a:spLocks noGrp="1"/>
+          </p:cNvSpPr>
+          <p:nvPr>
+            <p:ph idx="1"/>
+          </p:nvPr>
+        </p:nvSpPr>
+        <p:spPr/>
+        <p:txBody>
+          <a:bodyPr vert="horz" lIns="91440" tIns="45720" rIns="91440" bIns="45720" rtlCol="0" anchor="t">
+            <a:normAutofit/>
+          </a:bodyPr>
+          <a:lstStyle/>
+          <a:p>
+            <a:r>
+              <a:rPr lang="es-ES" dirty="0" err="1">
+                <a:cs typeface="Calibri"/>
+              </a:rPr>
+              <a:t>Compared</a:t>
+            </a:r>
+            <a:r>
+              <a:rPr lang="es-ES" dirty="0">
+                <a:cs typeface="Calibri"/>
+              </a:rPr>
+              <a:t> </a:t>
+            </a:r>
+            <a:r>
+              <a:rPr lang="es-ES" dirty="0" err="1">
+                <a:cs typeface="Calibri"/>
+              </a:rPr>
+              <a:t>three</a:t>
+            </a:r>
+            <a:r>
+              <a:rPr lang="es-ES" dirty="0">
+                <a:cs typeface="Calibri"/>
+              </a:rPr>
+              <a:t> </a:t>
+            </a:r>
+            <a:r>
+              <a:rPr lang="es-ES" dirty="0" err="1">
+                <a:cs typeface="Calibri"/>
+              </a:rPr>
+              <a:t>models</a:t>
+            </a:r>
+            <a:r>
+              <a:rPr lang="es-ES" dirty="0">
+                <a:cs typeface="Calibri"/>
+              </a:rPr>
+              <a:t>: </a:t>
+            </a:r>
+            <a:r>
+              <a:rPr lang="es-ES" dirty="0" err="1">
+                <a:cs typeface="Calibri"/>
+              </a:rPr>
+              <a:t>pooling</a:t>
+            </a:r>
+            <a:r>
+              <a:rPr lang="es-ES" dirty="0">
+                <a:cs typeface="Calibri"/>
+              </a:rPr>
+              <a:t>, </a:t>
+            </a:r>
+            <a:r>
+              <a:rPr lang="es-ES" dirty="0" err="1">
+                <a:cs typeface="Calibri"/>
+              </a:rPr>
+              <a:t>cnn</a:t>
+            </a:r>
+            <a:r>
+              <a:rPr lang="es-ES" dirty="0">
+                <a:cs typeface="Calibri"/>
+              </a:rPr>
+              <a:t>, and </a:t>
+            </a:r>
+            <a:r>
+              <a:rPr lang="es-ES" dirty="0" err="1">
+                <a:cs typeface="Calibri"/>
+              </a:rPr>
+              <a:t>lstm</a:t>
+            </a:r>
+            <a:endParaRPr lang="es-ES" dirty="0">
+              <a:cs typeface="Calibri"/>
+            </a:endParaRPr>
+          </a:p>
+          <a:p>
+            <a:pPr lvl="1"/>
+            <a:r>
+              <a:rPr lang="es-ES" err="1">
+                <a:highlight>
+                  <a:srgbClr val="FFFF00"/>
+                </a:highlight>
+                <a:ea typeface="+mn-lt"/>
+                <a:cs typeface="+mn-lt"/>
+              </a:rPr>
+              <a:t>Pooling</a:t>
+            </a:r>
+            <a:endParaRPr lang="es-ES">
+              <a:highlight>
+                <a:srgbClr val="FFFF00"/>
+              </a:highlight>
+              <a:ea typeface="+mn-lt"/>
+              <a:cs typeface="+mn-lt"/>
+            </a:endParaRPr>
+          </a:p>
+          <a:p>
+            <a:pPr lvl="2"/>
+            <a:r>
+              <a:rPr lang="es-ES" dirty="0" err="1">
+                <a:ea typeface="+mn-lt"/>
+                <a:cs typeface="+mn-lt"/>
+              </a:rPr>
+              <a:t>Mrr</a:t>
+            </a:r>
+            <a:r>
+              <a:rPr lang="es-ES" dirty="0">
+                <a:ea typeface="+mn-lt"/>
+                <a:cs typeface="+mn-lt"/>
+              </a:rPr>
+              <a:t> </a:t>
+            </a:r>
+            <a:r>
+              <a:rPr lang="es-ES" dirty="0" err="1">
+                <a:ea typeface="+mn-lt"/>
+                <a:cs typeface="+mn-lt"/>
+              </a:rPr>
+              <a:t>validation</a:t>
+            </a:r>
+            <a:r>
+              <a:rPr lang="es-ES" dirty="0">
+                <a:ea typeface="+mn-lt"/>
+                <a:cs typeface="+mn-lt"/>
+              </a:rPr>
+              <a:t> score= 0.0415</a:t>
+            </a:r>
+          </a:p>
+          <a:p>
+            <a:pPr lvl="2"/>
+            <a:r>
+              <a:rPr lang="es-ES" dirty="0" err="1">
+                <a:ea typeface="+mn-lt"/>
+                <a:cs typeface="+mn-lt"/>
+              </a:rPr>
+              <a:t>Average</a:t>
+            </a:r>
+            <a:r>
+              <a:rPr lang="es-ES" dirty="0">
+                <a:ea typeface="+mn-lt"/>
+                <a:cs typeface="+mn-lt"/>
+              </a:rPr>
+              <a:t> </a:t>
+            </a:r>
+            <a:r>
+              <a:rPr lang="es-ES" dirty="0" err="1">
+                <a:ea typeface="+mn-lt"/>
+                <a:cs typeface="+mn-lt"/>
+              </a:rPr>
+              <a:t>first</a:t>
+            </a:r>
+            <a:r>
+              <a:rPr lang="es-ES" dirty="0">
+                <a:ea typeface="+mn-lt"/>
+                <a:cs typeface="+mn-lt"/>
+              </a:rPr>
+              <a:t> </a:t>
+            </a:r>
+            <a:r>
+              <a:rPr lang="es-ES" dirty="0" err="1">
+                <a:ea typeface="+mn-lt"/>
+                <a:cs typeface="+mn-lt"/>
+              </a:rPr>
+              <a:t>relevant</a:t>
+            </a:r>
+            <a:r>
+              <a:rPr lang="es-ES" dirty="0">
+                <a:ea typeface="+mn-lt"/>
+                <a:cs typeface="+mn-lt"/>
+              </a:rPr>
+              <a:t> </a:t>
+            </a:r>
+            <a:r>
+              <a:rPr lang="es-ES" dirty="0" err="1">
+                <a:ea typeface="+mn-lt"/>
+                <a:cs typeface="+mn-lt"/>
+              </a:rPr>
+              <a:t>movie</a:t>
+            </a:r>
+            <a:r>
+              <a:rPr lang="es-ES" dirty="0">
+                <a:ea typeface="+mn-lt"/>
+                <a:cs typeface="+mn-lt"/>
+              </a:rPr>
+              <a:t> </a:t>
+            </a:r>
+            <a:r>
+              <a:rPr lang="es-ES" dirty="0" err="1">
+                <a:ea typeface="+mn-lt"/>
+                <a:cs typeface="+mn-lt"/>
+              </a:rPr>
+              <a:t>is</a:t>
+            </a:r>
+            <a:r>
+              <a:rPr lang="es-ES" dirty="0">
+                <a:ea typeface="+mn-lt"/>
+                <a:cs typeface="+mn-lt"/>
+              </a:rPr>
+              <a:t> at place 278.9352038996552 </a:t>
+            </a:r>
+            <a:endParaRPr lang="es-ES" dirty="0"/>
+          </a:p>
+          <a:p>
+            <a:pPr lvl="1"/>
+            <a:r>
+              <a:rPr lang="es-ES" dirty="0">
+                <a:ea typeface="+mn-lt"/>
+                <a:cs typeface="+mn-lt"/>
+              </a:rPr>
+              <a:t>CNN</a:t>
+            </a:r>
+          </a:p>
+          <a:p>
+            <a:pPr lvl="2"/>
+            <a:r>
+              <a:rPr lang="es-ES" dirty="0" err="1">
+                <a:ea typeface="+mn-lt"/>
+                <a:cs typeface="+mn-lt"/>
+              </a:rPr>
+              <a:t>Mrr</a:t>
+            </a:r>
+            <a:r>
+              <a:rPr lang="es-ES" dirty="0">
+                <a:ea typeface="+mn-lt"/>
+                <a:cs typeface="+mn-lt"/>
+              </a:rPr>
+              <a:t> </a:t>
+            </a:r>
+            <a:r>
+              <a:rPr lang="es-ES" dirty="0" err="1">
+                <a:ea typeface="+mn-lt"/>
+                <a:cs typeface="+mn-lt"/>
+              </a:rPr>
+              <a:t>validation</a:t>
+            </a:r>
+            <a:r>
+              <a:rPr lang="es-ES" dirty="0">
+                <a:ea typeface="+mn-lt"/>
+                <a:cs typeface="+mn-lt"/>
+              </a:rPr>
+              <a:t> score= 0.0444</a:t>
+            </a:r>
+          </a:p>
+          <a:p>
+            <a:pPr lvl="2"/>
+            <a:r>
+              <a:rPr lang="es-ES" dirty="0" err="1">
+                <a:ea typeface="+mn-lt"/>
+                <a:cs typeface="+mn-lt"/>
+              </a:rPr>
+              <a:t>Average</a:t>
+            </a:r>
+            <a:r>
+              <a:rPr lang="es-ES" dirty="0">
+                <a:ea typeface="+mn-lt"/>
+                <a:cs typeface="+mn-lt"/>
+              </a:rPr>
+              <a:t> </a:t>
+            </a:r>
+            <a:r>
+              <a:rPr lang="es-ES" dirty="0" err="1">
+                <a:ea typeface="+mn-lt"/>
+                <a:cs typeface="+mn-lt"/>
+              </a:rPr>
+              <a:t>first</a:t>
+            </a:r>
+            <a:r>
+              <a:rPr lang="es-ES" dirty="0">
+                <a:ea typeface="+mn-lt"/>
+                <a:cs typeface="+mn-lt"/>
+              </a:rPr>
+              <a:t> </a:t>
+            </a:r>
+            <a:r>
+              <a:rPr lang="es-ES" dirty="0" err="1">
+                <a:ea typeface="+mn-lt"/>
+                <a:cs typeface="+mn-lt"/>
+              </a:rPr>
+              <a:t>relevant</a:t>
+            </a:r>
+            <a:r>
+              <a:rPr lang="es-ES" dirty="0">
+                <a:ea typeface="+mn-lt"/>
+                <a:cs typeface="+mn-lt"/>
+              </a:rPr>
+              <a:t> </a:t>
+            </a:r>
+            <a:r>
+              <a:rPr lang="es-ES" dirty="0" err="1">
+                <a:ea typeface="+mn-lt"/>
+                <a:cs typeface="+mn-lt"/>
+              </a:rPr>
+              <a:t>movie</a:t>
+            </a:r>
+            <a:r>
+              <a:rPr lang="es-ES" dirty="0">
+                <a:ea typeface="+mn-lt"/>
+                <a:cs typeface="+mn-lt"/>
+              </a:rPr>
+              <a:t> </a:t>
+            </a:r>
+            <a:r>
+              <a:rPr lang="es-ES" dirty="0" err="1">
+                <a:ea typeface="+mn-lt"/>
+                <a:cs typeface="+mn-lt"/>
+              </a:rPr>
+              <a:t>is</a:t>
+            </a:r>
+            <a:r>
+              <a:rPr lang="es-ES" dirty="0">
+                <a:ea typeface="+mn-lt"/>
+                <a:cs typeface="+mn-lt"/>
+              </a:rPr>
+              <a:t> at place 327.1417191772679</a:t>
+            </a:r>
+            <a:endParaRPr lang="es-ES" dirty="0"/>
+          </a:p>
+          <a:p>
+            <a:pPr lvl="1"/>
+            <a:r>
+              <a:rPr lang="es-ES" dirty="0">
+                <a:ea typeface="+mn-lt"/>
+                <a:cs typeface="+mn-lt"/>
+              </a:rPr>
+              <a:t>LSTM</a:t>
+            </a:r>
+          </a:p>
+          <a:p>
+            <a:pPr lvl="2"/>
+            <a:r>
+              <a:rPr lang="es-ES" dirty="0" err="1">
+                <a:ea typeface="+mn-lt"/>
+                <a:cs typeface="+mn-lt"/>
+              </a:rPr>
+              <a:t>Mrr</a:t>
+            </a:r>
+            <a:r>
+              <a:rPr lang="es-ES" dirty="0">
+                <a:ea typeface="+mn-lt"/>
+                <a:cs typeface="+mn-lt"/>
+              </a:rPr>
+              <a:t> </a:t>
+            </a:r>
+            <a:r>
+              <a:rPr lang="es-ES" dirty="0" err="1">
+                <a:ea typeface="+mn-lt"/>
+                <a:cs typeface="+mn-lt"/>
+              </a:rPr>
+              <a:t>validation</a:t>
+            </a:r>
+            <a:r>
+              <a:rPr lang="es-ES" dirty="0">
+                <a:ea typeface="+mn-lt"/>
+                <a:cs typeface="+mn-lt"/>
+              </a:rPr>
+              <a:t> score= 0.0131</a:t>
+            </a:r>
+            <a:endParaRPr lang="en-US" dirty="0">
+              <a:ea typeface="+mn-lt"/>
+              <a:cs typeface="+mn-lt"/>
+            </a:endParaRPr>
+          </a:p>
+          <a:p>
+            <a:pPr lvl="2"/>
+            <a:r>
+              <a:rPr lang="es-ES" dirty="0" err="1">
+                <a:ea typeface="+mn-lt"/>
+                <a:cs typeface="+mn-lt"/>
+              </a:rPr>
+              <a:t>Average</a:t>
+            </a:r>
+            <a:r>
+              <a:rPr lang="es-ES" dirty="0">
+                <a:ea typeface="+mn-lt"/>
+                <a:cs typeface="+mn-lt"/>
+              </a:rPr>
+              <a:t> </a:t>
+            </a:r>
+            <a:r>
+              <a:rPr lang="es-ES" dirty="0" err="1">
+                <a:ea typeface="+mn-lt"/>
+                <a:cs typeface="+mn-lt"/>
+              </a:rPr>
+              <a:t>first</a:t>
+            </a:r>
+            <a:r>
+              <a:rPr lang="es-ES" dirty="0">
+                <a:ea typeface="+mn-lt"/>
+                <a:cs typeface="+mn-lt"/>
+              </a:rPr>
+              <a:t> </a:t>
+            </a:r>
+            <a:r>
+              <a:rPr lang="es-ES" dirty="0" err="1">
+                <a:ea typeface="+mn-lt"/>
+                <a:cs typeface="+mn-lt"/>
+              </a:rPr>
+              <a:t>relevant</a:t>
+            </a:r>
+            <a:r>
+              <a:rPr lang="es-ES" dirty="0">
+                <a:ea typeface="+mn-lt"/>
+                <a:cs typeface="+mn-lt"/>
+              </a:rPr>
+              <a:t> </a:t>
+            </a:r>
+            <a:r>
+              <a:rPr lang="es-ES" dirty="0" err="1">
+                <a:ea typeface="+mn-lt"/>
+                <a:cs typeface="+mn-lt"/>
+              </a:rPr>
+              <a:t>movie</a:t>
+            </a:r>
+            <a:r>
+              <a:rPr lang="es-ES" dirty="0">
+                <a:ea typeface="+mn-lt"/>
+                <a:cs typeface="+mn-lt"/>
+              </a:rPr>
+              <a:t> </a:t>
+            </a:r>
+            <a:r>
+              <a:rPr lang="es-ES" dirty="0" err="1">
+                <a:ea typeface="+mn-lt"/>
+                <a:cs typeface="+mn-lt"/>
+              </a:rPr>
+              <a:t>is</a:t>
+            </a:r>
+            <a:r>
+              <a:rPr lang="es-ES" dirty="0">
+                <a:ea typeface="+mn-lt"/>
+                <a:cs typeface="+mn-lt"/>
+              </a:rPr>
+              <a:t> at place 713.9399595767447</a:t>
+            </a:r>
+          </a:p>
+          <a:p>
+            <a:pPr lvl="2"/>
+            <a:endParaRPr lang="es-ES">
+              <a:cs typeface="Calibri" panose="020F0502020204030204"/>
+            </a:endParaRPr>
+          </a:p>
+          <a:p>
+            <a:pPr lvl="2"/>
+            <a:endParaRPr lang="es-ES">
+              <a:cs typeface="Calibri" panose="020F0502020204030204"/>
+            </a:endParaRPr>
+          </a:p>
+          <a:p>
+            <a:pPr lvl="2"/>
+            <a:endParaRPr lang="es-ES">
+              <a:cs typeface="Calibri" panose="020F0502020204030204"/>
+            </a:endParaRPr>
+          </a:p>
+          <a:p>
+            <a:pPr lvl="2"/>
+            <a:endParaRPr lang="es-ES">
+              <a:cs typeface="Calibri" panose="020F0502020204030204"/>
+            </a:endParaRPr>
+          </a:p>
+        </p:txBody>
+      </p:sp>
+    </p:spTree>
+    <p:extLst>
+      <p:ext uri="{BB962C8B-B14F-4D97-AF65-F5344CB8AC3E}">
+        <p14:creationId xmlns:p14="http://schemas.microsoft.com/office/powerpoint/2010/main" val="3494565221"/>
+      </p:ext>
+    </p:extLst>
+  </p:cSld>
+  <p:clrMapOvr>
+    <a:masterClrMapping/>
+  </p:clrMapOvr>
+</p:sld>
+</file>
+
 <file path=ppt/theme/theme1.xml><?xml version="1.0" encoding="utf-8"?>
 <a:theme xmlns:a="http://schemas.openxmlformats.org/drawingml/2006/main" name="Tema de Office">
   <a:themeElements>

</xml_diff>